<commit_message>
Added initial cryptography slides
</commit_message>
<xml_diff>
--- a/Lectures/6 Cryptography.pptx
+++ b/Lectures/6 Cryptography.pptx
@@ -5,7 +5,7 @@
     <p:sldMasterId id="2147483673" r:id="rId1"/>
   </p:sldMasterIdLst>
   <p:notesMasterIdLst>
-    <p:notesMasterId r:id="rId10"/>
+    <p:notesMasterId r:id="rId11"/>
   </p:notesMasterIdLst>
   <p:sldIdLst>
     <p:sldId id="256" r:id="rId2"/>
@@ -16,6 +16,7 @@
     <p:sldId id="261" r:id="rId7"/>
     <p:sldId id="263" r:id="rId8"/>
     <p:sldId id="264" r:id="rId9"/>
+    <p:sldId id="265" r:id="rId10"/>
   </p:sldIdLst>
   <p:sldSz cx="9144000" cy="6858000" type="screen4x3"/>
   <p:notesSz cx="6858000" cy="9144000"/>
@@ -270,8 +271,7 @@
 <file path=ppt/revisionInfo.xml><?xml version="1.0" encoding="utf-8"?>
 <p1510:revInfo xmlns:a="http://schemas.openxmlformats.org/drawingml/2006/main" xmlns:r="http://schemas.openxmlformats.org/officeDocument/2006/relationships" xmlns:p1510="http://schemas.microsoft.com/office/powerpoint/2015/10/main">
   <p1510:revLst>
-    <p1510:client id="{968CECAF-2F69-484F-A443-05F56352F758}" v="36" dt="2024-06-25T20:28:47.776"/>
-    <p1510:client id="{E0F7C695-17E7-5E4E-B5CD-BAA7CDB2B17E}" v="40" dt="2024-06-26T18:13:37.910"/>
+    <p1510:client id="{E0F7C695-17E7-5E4E-B5CD-BAA7CDB2B17E}" v="41" dt="2024-07-01T07:33:13.922"/>
   </p1510:revLst>
 </p1510:revInfo>
 </file>
@@ -1186,19 +1186,19 @@
   </pc:docChgLst>
   <pc:docChgLst>
     <pc:chgData name="Omar Choudhry" userId="7e802f98-9170-4306-b59f-36dfa75ece39" providerId="ADAL" clId="{E0F7C695-17E7-5E4E-B5CD-BAA7CDB2B17E}"/>
-    <pc:docChg chg="addSld delSld modSld">
-      <pc:chgData name="Omar Choudhry" userId="7e802f98-9170-4306-b59f-36dfa75ece39" providerId="ADAL" clId="{E0F7C695-17E7-5E4E-B5CD-BAA7CDB2B17E}" dt="2024-06-26T18:13:44.969" v="104" actId="2696"/>
+    <pc:docChg chg="custSel addSld delSld modSld">
+      <pc:chgData name="Omar Choudhry" userId="7e802f98-9170-4306-b59f-36dfa75ece39" providerId="ADAL" clId="{E0F7C695-17E7-5E4E-B5CD-BAA7CDB2B17E}" dt="2024-07-02T07:33:44.956" v="123" actId="20577"/>
       <pc:docMkLst>
         <pc:docMk/>
       </pc:docMkLst>
       <pc:sldChg chg="modSp mod modNotesTx">
-        <pc:chgData name="Omar Choudhry" userId="7e802f98-9170-4306-b59f-36dfa75ece39" providerId="ADAL" clId="{E0F7C695-17E7-5E4E-B5CD-BAA7CDB2B17E}" dt="2024-06-25T20:50:51.219" v="41"/>
+        <pc:chgData name="Omar Choudhry" userId="7e802f98-9170-4306-b59f-36dfa75ece39" providerId="ADAL" clId="{E0F7C695-17E7-5E4E-B5CD-BAA7CDB2B17E}" dt="2024-07-02T07:33:44.956" v="123" actId="20577"/>
         <pc:sldMkLst>
           <pc:docMk/>
           <pc:sldMk cId="0" sldId="256"/>
         </pc:sldMkLst>
         <pc:spChg chg="mod">
-          <ac:chgData name="Omar Choudhry" userId="7e802f98-9170-4306-b59f-36dfa75ece39" providerId="ADAL" clId="{E0F7C695-17E7-5E4E-B5CD-BAA7CDB2B17E}" dt="2024-06-25T20:50:44.114" v="40"/>
+          <ac:chgData name="Omar Choudhry" userId="7e802f98-9170-4306-b59f-36dfa75ece39" providerId="ADAL" clId="{E0F7C695-17E7-5E4E-B5CD-BAA7CDB2B17E}" dt="2024-07-02T07:33:44.956" v="123" actId="20577"/>
           <ac:spMkLst>
             <pc:docMk/>
             <pc:sldMk cId="0" sldId="256"/>
@@ -1459,6 +1459,29 @@
           <pc:docMk/>
           <pc:sldMk cId="682528750" sldId="265"/>
         </pc:sldMkLst>
+      </pc:sldChg>
+      <pc:sldChg chg="delSp add mod">
+        <pc:chgData name="Omar Choudhry" userId="7e802f98-9170-4306-b59f-36dfa75ece39" providerId="ADAL" clId="{E0F7C695-17E7-5E4E-B5CD-BAA7CDB2B17E}" dt="2024-07-01T07:33:13.922" v="107" actId="478"/>
+        <pc:sldMkLst>
+          <pc:docMk/>
+          <pc:sldMk cId="1916915106" sldId="265"/>
+        </pc:sldMkLst>
+        <pc:spChg chg="del">
+          <ac:chgData name="Omar Choudhry" userId="7e802f98-9170-4306-b59f-36dfa75ece39" providerId="ADAL" clId="{E0F7C695-17E7-5E4E-B5CD-BAA7CDB2B17E}" dt="2024-07-01T07:33:13.104" v="106" actId="478"/>
+          <ac:spMkLst>
+            <pc:docMk/>
+            <pc:sldMk cId="1916915106" sldId="265"/>
+            <ac:spMk id="11" creationId="{CC13C3F4-AFB1-9435-7D0A-5E985F9E1D23}"/>
+          </ac:spMkLst>
+        </pc:spChg>
+        <pc:picChg chg="del">
+          <ac:chgData name="Omar Choudhry" userId="7e802f98-9170-4306-b59f-36dfa75ece39" providerId="ADAL" clId="{E0F7C695-17E7-5E4E-B5CD-BAA7CDB2B17E}" dt="2024-07-01T07:33:13.922" v="107" actId="478"/>
+          <ac:picMkLst>
+            <pc:docMk/>
+            <pc:sldMk cId="1916915106" sldId="265"/>
+            <ac:picMk id="6146" creationId="{821ECF5D-ED35-EA96-3D55-AAC2691F07B9}"/>
+          </ac:picMkLst>
+        </pc:picChg>
       </pc:sldChg>
       <pc:sldChg chg="new del">
         <pc:chgData name="Omar Choudhry" userId="7e802f98-9170-4306-b59f-36dfa75ece39" providerId="ADAL" clId="{E0F7C695-17E7-5E4E-B5CD-BAA7CDB2B17E}" dt="2024-06-26T18:06:11.247" v="95" actId="2696"/>
@@ -2989,6 +3012,604 @@
               <a:t>Public and Private Cryptography</a:t>
             </a:r>
           </a:p>
+          <a:p>
+            <a:endParaRPr lang="en-GB" dirty="0">
+              <a:solidFill>
+                <a:srgbClr val="FFFFFF"/>
+              </a:solidFill>
+              <a:effectLst/>
+              <a:highlight>
+                <a:srgbClr val="1F1F24"/>
+              </a:highlight>
+              <a:latin typeface="Menlo" panose="020B0609030804020204" pitchFamily="49" charset="0"/>
+            </a:endParaRPr>
+          </a:p>
+          <a:p>
+            <a:endParaRPr lang="en-GB" dirty="0">
+              <a:solidFill>
+                <a:srgbClr val="FFFFFF"/>
+              </a:solidFill>
+              <a:effectLst/>
+              <a:highlight>
+                <a:srgbClr val="1F1F24"/>
+              </a:highlight>
+              <a:latin typeface="Menlo" panose="020B0609030804020204" pitchFamily="49" charset="0"/>
+            </a:endParaRPr>
+          </a:p>
+          <a:p>
+            <a:r>
+              <a:rPr lang="en-GB" dirty="0">
+                <a:solidFill>
+                  <a:srgbClr val="FFFFFF"/>
+                </a:solidFill>
+                <a:effectLst/>
+                <a:highlight>
+                  <a:srgbClr val="1F1F24"/>
+                </a:highlight>
+                <a:latin typeface="Menlo" panose="020B0609030804020204" pitchFamily="49" charset="0"/>
+              </a:rPr>
+              <a:t>7. </a:t>
+            </a:r>
+            <a:r>
+              <a:rPr lang="en-GB" dirty="0">
+                <a:solidFill>
+                  <a:srgbClr val="BF8555"/>
+                </a:solidFill>
+                <a:effectLst/>
+                <a:highlight>
+                  <a:srgbClr val="1F1F24"/>
+                </a:highlight>
+                <a:latin typeface="Menlo" panose="020B0609030804020204" pitchFamily="49" charset="0"/>
+              </a:rPr>
+              <a:t>**</a:t>
+            </a:r>
+            <a:r>
+              <a:rPr lang="en-GB" b="1" dirty="0">
+                <a:solidFill>
+                  <a:srgbClr val="FFFFFF"/>
+                </a:solidFill>
+                <a:effectLst/>
+                <a:highlight>
+                  <a:srgbClr val="1F1F24"/>
+                </a:highlight>
+                <a:latin typeface="Menlo" panose="020B0609030804020204" pitchFamily="49" charset="0"/>
+              </a:rPr>
+              <a:t>Encryption (30 mins)</a:t>
+            </a:r>
+            <a:r>
+              <a:rPr lang="en-GB" dirty="0">
+                <a:solidFill>
+                  <a:srgbClr val="BF8555"/>
+                </a:solidFill>
+                <a:effectLst/>
+                <a:highlight>
+                  <a:srgbClr val="1F1F24"/>
+                </a:highlight>
+                <a:latin typeface="Menlo" panose="020B0609030804020204" pitchFamily="49" charset="0"/>
+              </a:rPr>
+              <a:t>**</a:t>
+            </a:r>
+            <a:endParaRPr lang="en-GB" dirty="0">
+              <a:solidFill>
+                <a:srgbClr val="FFFFFF"/>
+              </a:solidFill>
+              <a:effectLst/>
+              <a:highlight>
+                <a:srgbClr val="1F1F24"/>
+              </a:highlight>
+              <a:latin typeface="Menlo" panose="020B0609030804020204" pitchFamily="49" charset="0"/>
+            </a:endParaRPr>
+          </a:p>
+          <a:p>
+            <a:r>
+              <a:rPr lang="en-GB" dirty="0">
+                <a:solidFill>
+                  <a:srgbClr val="FFFFFF"/>
+                </a:solidFill>
+                <a:effectLst/>
+                <a:highlight>
+                  <a:srgbClr val="1F1F24"/>
+                </a:highlight>
+                <a:latin typeface="Menlo" panose="020B0609030804020204" pitchFamily="49" charset="0"/>
+              </a:rPr>
+              <a:t>    </a:t>
+            </a:r>
+            <a:r>
+              <a:rPr lang="en-GB" dirty="0">
+                <a:solidFill>
+                  <a:srgbClr val="BF8555"/>
+                </a:solidFill>
+                <a:effectLst/>
+                <a:highlight>
+                  <a:srgbClr val="1F1F24"/>
+                </a:highlight>
+                <a:latin typeface="Menlo" panose="020B0609030804020204" pitchFamily="49" charset="0"/>
+              </a:rPr>
+              <a:t>- </a:t>
+            </a:r>
+            <a:r>
+              <a:rPr lang="en-GB" dirty="0">
+                <a:solidFill>
+                  <a:srgbClr val="FFFFFF"/>
+                </a:solidFill>
+                <a:effectLst/>
+                <a:highlight>
+                  <a:srgbClr val="1F1F24"/>
+                </a:highlight>
+                <a:latin typeface="Menlo" panose="020B0609030804020204" pitchFamily="49" charset="0"/>
+              </a:rPr>
+              <a:t>Explain how we perform encryption and different forms of encryption.</a:t>
+            </a:r>
+          </a:p>
+          <a:p>
+            <a:r>
+              <a:rPr lang="en-GB" dirty="0">
+                <a:solidFill>
+                  <a:srgbClr val="FFFFFF"/>
+                </a:solidFill>
+                <a:effectLst/>
+                <a:highlight>
+                  <a:srgbClr val="1F1F24"/>
+                </a:highlight>
+                <a:latin typeface="Menlo" panose="020B0609030804020204" pitchFamily="49" charset="0"/>
+              </a:rPr>
+              <a:t>    </a:t>
+            </a:r>
+            <a:r>
+              <a:rPr lang="en-GB" dirty="0">
+                <a:solidFill>
+                  <a:srgbClr val="BF8555"/>
+                </a:solidFill>
+                <a:effectLst/>
+                <a:highlight>
+                  <a:srgbClr val="1F1F24"/>
+                </a:highlight>
+                <a:latin typeface="Menlo" panose="020B0609030804020204" pitchFamily="49" charset="0"/>
+              </a:rPr>
+              <a:t>- </a:t>
+            </a:r>
+            <a:r>
+              <a:rPr lang="en-GB" dirty="0">
+                <a:solidFill>
+                  <a:srgbClr val="FFFFFF"/>
+                </a:solidFill>
+                <a:effectLst/>
+                <a:highlight>
+                  <a:srgbClr val="1F1F24"/>
+                </a:highlight>
+                <a:latin typeface="Menlo" panose="020B0609030804020204" pitchFamily="49" charset="0"/>
+              </a:rPr>
+              <a:t>Topics:</a:t>
+            </a:r>
+          </a:p>
+          <a:p>
+            <a:r>
+              <a:rPr lang="en-GB" dirty="0">
+                <a:solidFill>
+                  <a:srgbClr val="FFFFFF"/>
+                </a:solidFill>
+                <a:effectLst/>
+                <a:highlight>
+                  <a:srgbClr val="1F1F24"/>
+                </a:highlight>
+                <a:latin typeface="Menlo" panose="020B0609030804020204" pitchFamily="49" charset="0"/>
+              </a:rPr>
+              <a:t>        </a:t>
+            </a:r>
+            <a:r>
+              <a:rPr lang="en-GB" dirty="0">
+                <a:solidFill>
+                  <a:srgbClr val="BF8555"/>
+                </a:solidFill>
+                <a:effectLst/>
+                <a:highlight>
+                  <a:srgbClr val="1F1F24"/>
+                </a:highlight>
+                <a:latin typeface="Menlo" panose="020B0609030804020204" pitchFamily="49" charset="0"/>
+              </a:rPr>
+              <a:t>- </a:t>
+            </a:r>
+            <a:r>
+              <a:rPr lang="en-GB" dirty="0">
+                <a:solidFill>
+                  <a:srgbClr val="FFFFFF"/>
+                </a:solidFill>
+                <a:effectLst/>
+                <a:highlight>
+                  <a:srgbClr val="1F1F24"/>
+                </a:highlight>
+                <a:latin typeface="Menlo" panose="020B0609030804020204" pitchFamily="49" charset="0"/>
+              </a:rPr>
+              <a:t>Symmetric Encryption</a:t>
+            </a:r>
+          </a:p>
+          <a:p>
+            <a:r>
+              <a:rPr lang="en-GB" dirty="0">
+                <a:solidFill>
+                  <a:srgbClr val="FFFFFF"/>
+                </a:solidFill>
+                <a:effectLst/>
+                <a:highlight>
+                  <a:srgbClr val="1F1F24"/>
+                </a:highlight>
+                <a:latin typeface="Menlo" panose="020B0609030804020204" pitchFamily="49" charset="0"/>
+              </a:rPr>
+              <a:t>        </a:t>
+            </a:r>
+            <a:r>
+              <a:rPr lang="en-GB" dirty="0">
+                <a:solidFill>
+                  <a:srgbClr val="BF8555"/>
+                </a:solidFill>
+                <a:effectLst/>
+                <a:highlight>
+                  <a:srgbClr val="1F1F24"/>
+                </a:highlight>
+                <a:latin typeface="Menlo" panose="020B0609030804020204" pitchFamily="49" charset="0"/>
+              </a:rPr>
+              <a:t>- </a:t>
+            </a:r>
+            <a:r>
+              <a:rPr lang="en-GB" dirty="0">
+                <a:solidFill>
+                  <a:srgbClr val="FFFFFF"/>
+                </a:solidFill>
+                <a:effectLst/>
+                <a:highlight>
+                  <a:srgbClr val="1F1F24"/>
+                </a:highlight>
+                <a:latin typeface="Menlo" panose="020B0609030804020204" pitchFamily="49" charset="0"/>
+              </a:rPr>
+              <a:t>Asymmetric Encryption</a:t>
+            </a:r>
+          </a:p>
+          <a:p>
+            <a:r>
+              <a:rPr lang="en-GB" dirty="0">
+                <a:solidFill>
+                  <a:srgbClr val="FFFFFF"/>
+                </a:solidFill>
+                <a:effectLst/>
+                <a:highlight>
+                  <a:srgbClr val="1F1F24"/>
+                </a:highlight>
+                <a:latin typeface="Menlo" panose="020B0609030804020204" pitchFamily="49" charset="0"/>
+              </a:rPr>
+              <a:t>        </a:t>
+            </a:r>
+            <a:r>
+              <a:rPr lang="en-GB" dirty="0">
+                <a:solidFill>
+                  <a:srgbClr val="BF8555"/>
+                </a:solidFill>
+                <a:effectLst/>
+                <a:highlight>
+                  <a:srgbClr val="1F1F24"/>
+                </a:highlight>
+                <a:latin typeface="Menlo" panose="020B0609030804020204" pitchFamily="49" charset="0"/>
+              </a:rPr>
+              <a:t>- </a:t>
+            </a:r>
+            <a:r>
+              <a:rPr lang="en-GB" dirty="0">
+                <a:solidFill>
+                  <a:srgbClr val="FFFFFF"/>
+                </a:solidFill>
+                <a:effectLst/>
+                <a:highlight>
+                  <a:srgbClr val="1F1F24"/>
+                </a:highlight>
+                <a:latin typeface="Menlo" panose="020B0609030804020204" pitchFamily="49" charset="0"/>
+              </a:rPr>
+              <a:t>Hashing</a:t>
+            </a:r>
+          </a:p>
+          <a:p>
+            <a:br>
+              <a:rPr lang="en-GB" dirty="0">
+                <a:solidFill>
+                  <a:srgbClr val="FFFFFF"/>
+                </a:solidFill>
+                <a:effectLst/>
+                <a:highlight>
+                  <a:srgbClr val="1F1F24"/>
+                </a:highlight>
+                <a:latin typeface="Menlo" panose="020B0609030804020204" pitchFamily="49" charset="0"/>
+              </a:rPr>
+            </a:br>
+            <a:endParaRPr lang="en-GB" dirty="0">
+              <a:solidFill>
+                <a:srgbClr val="FFFFFF"/>
+              </a:solidFill>
+              <a:effectLst/>
+              <a:highlight>
+                <a:srgbClr val="1F1F24"/>
+              </a:highlight>
+              <a:latin typeface="Menlo" panose="020B0609030804020204" pitchFamily="49" charset="0"/>
+            </a:endParaRPr>
+          </a:p>
+          <a:p>
+            <a:r>
+              <a:rPr lang="en-GB" dirty="0">
+                <a:solidFill>
+                  <a:srgbClr val="FFFFFF"/>
+                </a:solidFill>
+                <a:effectLst/>
+                <a:highlight>
+                  <a:srgbClr val="1F1F24"/>
+                </a:highlight>
+                <a:latin typeface="Menlo" panose="020B0609030804020204" pitchFamily="49" charset="0"/>
+              </a:rPr>
+              <a:t>8. </a:t>
+            </a:r>
+            <a:r>
+              <a:rPr lang="en-GB" dirty="0">
+                <a:solidFill>
+                  <a:srgbClr val="BF8555"/>
+                </a:solidFill>
+                <a:effectLst/>
+                <a:highlight>
+                  <a:srgbClr val="1F1F24"/>
+                </a:highlight>
+                <a:latin typeface="Menlo" panose="020B0609030804020204" pitchFamily="49" charset="0"/>
+              </a:rPr>
+              <a:t>**</a:t>
+            </a:r>
+            <a:r>
+              <a:rPr lang="en-GB" b="1" dirty="0">
+                <a:solidFill>
+                  <a:srgbClr val="FFFFFF"/>
+                </a:solidFill>
+                <a:effectLst/>
+                <a:highlight>
+                  <a:srgbClr val="1F1F24"/>
+                </a:highlight>
+                <a:latin typeface="Menlo" panose="020B0609030804020204" pitchFamily="49" charset="0"/>
+              </a:rPr>
+              <a:t>Decryption (30 mins)</a:t>
+            </a:r>
+            <a:r>
+              <a:rPr lang="en-GB" dirty="0">
+                <a:solidFill>
+                  <a:srgbClr val="BF8555"/>
+                </a:solidFill>
+                <a:effectLst/>
+                <a:highlight>
+                  <a:srgbClr val="1F1F24"/>
+                </a:highlight>
+                <a:latin typeface="Menlo" panose="020B0609030804020204" pitchFamily="49" charset="0"/>
+              </a:rPr>
+              <a:t>**</a:t>
+            </a:r>
+            <a:endParaRPr lang="en-GB" dirty="0">
+              <a:solidFill>
+                <a:srgbClr val="FFFFFF"/>
+              </a:solidFill>
+              <a:effectLst/>
+              <a:highlight>
+                <a:srgbClr val="1F1F24"/>
+              </a:highlight>
+              <a:latin typeface="Menlo" panose="020B0609030804020204" pitchFamily="49" charset="0"/>
+            </a:endParaRPr>
+          </a:p>
+          <a:p>
+            <a:r>
+              <a:rPr lang="en-GB" dirty="0">
+                <a:solidFill>
+                  <a:srgbClr val="FFFFFF"/>
+                </a:solidFill>
+                <a:effectLst/>
+                <a:highlight>
+                  <a:srgbClr val="1F1F24"/>
+                </a:highlight>
+                <a:latin typeface="Menlo" panose="020B0609030804020204" pitchFamily="49" charset="0"/>
+              </a:rPr>
+              <a:t>    </a:t>
+            </a:r>
+            <a:r>
+              <a:rPr lang="en-GB" dirty="0">
+                <a:solidFill>
+                  <a:srgbClr val="BF8555"/>
+                </a:solidFill>
+                <a:effectLst/>
+                <a:highlight>
+                  <a:srgbClr val="1F1F24"/>
+                </a:highlight>
+                <a:latin typeface="Menlo" panose="020B0609030804020204" pitchFamily="49" charset="0"/>
+              </a:rPr>
+              <a:t>- </a:t>
+            </a:r>
+            <a:r>
+              <a:rPr lang="en-GB" dirty="0">
+                <a:solidFill>
+                  <a:srgbClr val="FFFFFF"/>
+                </a:solidFill>
+                <a:effectLst/>
+                <a:highlight>
+                  <a:srgbClr val="1F1F24"/>
+                </a:highlight>
+                <a:latin typeface="Menlo" panose="020B0609030804020204" pitchFamily="49" charset="0"/>
+              </a:rPr>
+              <a:t>Explain how we perform decryption and then discuss issues regarding different cryptographic techniques.</a:t>
+            </a:r>
+          </a:p>
+          <a:p>
+            <a:r>
+              <a:rPr lang="en-GB" dirty="0">
+                <a:solidFill>
+                  <a:srgbClr val="FFFFFF"/>
+                </a:solidFill>
+                <a:effectLst/>
+                <a:highlight>
+                  <a:srgbClr val="1F1F24"/>
+                </a:highlight>
+                <a:latin typeface="Menlo" panose="020B0609030804020204" pitchFamily="49" charset="0"/>
+              </a:rPr>
+              <a:t>    </a:t>
+            </a:r>
+            <a:r>
+              <a:rPr lang="en-GB" dirty="0">
+                <a:solidFill>
+                  <a:srgbClr val="BF8555"/>
+                </a:solidFill>
+                <a:effectLst/>
+                <a:highlight>
+                  <a:srgbClr val="1F1F24"/>
+                </a:highlight>
+                <a:latin typeface="Menlo" panose="020B0609030804020204" pitchFamily="49" charset="0"/>
+              </a:rPr>
+              <a:t>- </a:t>
+            </a:r>
+            <a:r>
+              <a:rPr lang="en-GB" dirty="0">
+                <a:solidFill>
+                  <a:srgbClr val="FFFFFF"/>
+                </a:solidFill>
+                <a:effectLst/>
+                <a:highlight>
+                  <a:srgbClr val="1F1F24"/>
+                </a:highlight>
+                <a:latin typeface="Menlo" panose="020B0609030804020204" pitchFamily="49" charset="0"/>
+              </a:rPr>
+              <a:t>Topics:</a:t>
+            </a:r>
+          </a:p>
+          <a:p>
+            <a:r>
+              <a:rPr lang="en-GB" dirty="0">
+                <a:solidFill>
+                  <a:srgbClr val="FFFFFF"/>
+                </a:solidFill>
+                <a:effectLst/>
+                <a:highlight>
+                  <a:srgbClr val="1F1F24"/>
+                </a:highlight>
+                <a:latin typeface="Menlo" panose="020B0609030804020204" pitchFamily="49" charset="0"/>
+              </a:rPr>
+              <a:t>        </a:t>
+            </a:r>
+            <a:r>
+              <a:rPr lang="en-GB" dirty="0">
+                <a:solidFill>
+                  <a:srgbClr val="BF8555"/>
+                </a:solidFill>
+                <a:effectLst/>
+                <a:highlight>
+                  <a:srgbClr val="1F1F24"/>
+                </a:highlight>
+                <a:latin typeface="Menlo" panose="020B0609030804020204" pitchFamily="49" charset="0"/>
+              </a:rPr>
+              <a:t>- </a:t>
+            </a:r>
+            <a:r>
+              <a:rPr lang="en-GB" dirty="0">
+                <a:solidFill>
+                  <a:srgbClr val="FFFFFF"/>
+                </a:solidFill>
+                <a:effectLst/>
+                <a:highlight>
+                  <a:srgbClr val="1F1F24"/>
+                </a:highlight>
+                <a:latin typeface="Menlo" panose="020B0609030804020204" pitchFamily="49" charset="0"/>
+              </a:rPr>
+              <a:t>Symmetric Decryption</a:t>
+            </a:r>
+          </a:p>
+          <a:p>
+            <a:r>
+              <a:rPr lang="en-GB" dirty="0">
+                <a:solidFill>
+                  <a:srgbClr val="FFFFFF"/>
+                </a:solidFill>
+                <a:effectLst/>
+                <a:highlight>
+                  <a:srgbClr val="1F1F24"/>
+                </a:highlight>
+                <a:latin typeface="Menlo" panose="020B0609030804020204" pitchFamily="49" charset="0"/>
+              </a:rPr>
+              <a:t>        </a:t>
+            </a:r>
+            <a:r>
+              <a:rPr lang="en-GB" dirty="0">
+                <a:solidFill>
+                  <a:srgbClr val="BF8555"/>
+                </a:solidFill>
+                <a:effectLst/>
+                <a:highlight>
+                  <a:srgbClr val="1F1F24"/>
+                </a:highlight>
+                <a:latin typeface="Menlo" panose="020B0609030804020204" pitchFamily="49" charset="0"/>
+              </a:rPr>
+              <a:t>- </a:t>
+            </a:r>
+            <a:r>
+              <a:rPr lang="en-GB" dirty="0">
+                <a:solidFill>
+                  <a:srgbClr val="FFFFFF"/>
+                </a:solidFill>
+                <a:effectLst/>
+                <a:highlight>
+                  <a:srgbClr val="1F1F24"/>
+                </a:highlight>
+                <a:latin typeface="Menlo" panose="020B0609030804020204" pitchFamily="49" charset="0"/>
+              </a:rPr>
+              <a:t>Asymmetric Decryption</a:t>
+            </a:r>
+          </a:p>
+          <a:p>
+            <a:r>
+              <a:rPr lang="en-GB" dirty="0">
+                <a:solidFill>
+                  <a:srgbClr val="FFFFFF"/>
+                </a:solidFill>
+                <a:effectLst/>
+                <a:highlight>
+                  <a:srgbClr val="1F1F24"/>
+                </a:highlight>
+                <a:latin typeface="Menlo" panose="020B0609030804020204" pitchFamily="49" charset="0"/>
+              </a:rPr>
+              <a:t>        </a:t>
+            </a:r>
+            <a:r>
+              <a:rPr lang="en-GB" dirty="0">
+                <a:solidFill>
+                  <a:srgbClr val="BF8555"/>
+                </a:solidFill>
+                <a:effectLst/>
+                <a:highlight>
+                  <a:srgbClr val="1F1F24"/>
+                </a:highlight>
+                <a:latin typeface="Menlo" panose="020B0609030804020204" pitchFamily="49" charset="0"/>
+              </a:rPr>
+              <a:t>- </a:t>
+            </a:r>
+            <a:r>
+              <a:rPr lang="en-GB" dirty="0">
+                <a:solidFill>
+                  <a:srgbClr val="FFFFFF"/>
+                </a:solidFill>
+                <a:effectLst/>
+                <a:highlight>
+                  <a:srgbClr val="1F1F24"/>
+                </a:highlight>
+                <a:latin typeface="Menlo" panose="020B0609030804020204" pitchFamily="49" charset="0"/>
+              </a:rPr>
+              <a:t>Cryptographic Issues</a:t>
+            </a:r>
+          </a:p>
+          <a:p>
+            <a:endParaRPr lang="en-GB" dirty="0">
+              <a:solidFill>
+                <a:srgbClr val="FFFFFF"/>
+              </a:solidFill>
+              <a:effectLst/>
+              <a:highlight>
+                <a:srgbClr val="1F1F24"/>
+              </a:highlight>
+              <a:latin typeface="Menlo" panose="020B0609030804020204" pitchFamily="49" charset="0"/>
+            </a:endParaRPr>
+          </a:p>
         </p:txBody>
       </p:sp>
       <p:sp>
@@ -4219,6 +4840,175 @@
     <p:extLst>
       <p:ext uri="{BB962C8B-B14F-4D97-AF65-F5344CB8AC3E}">
         <p14:creationId xmlns:p14="http://schemas.microsoft.com/office/powerpoint/2010/main" val="3431165074"/>
+      </p:ext>
+    </p:extLst>
+  </p:cSld>
+  <p:clrMapOvr>
+    <a:masterClrMapping/>
+  </p:clrMapOvr>
+</p:notes>
+</file>
+
+<file path=ppt/notesSlides/notesSlide9.xml><?xml version="1.0" encoding="utf-8"?>
+<p:notes xmlns:a="http://schemas.openxmlformats.org/drawingml/2006/main" xmlns:r="http://schemas.openxmlformats.org/officeDocument/2006/relationships" xmlns:p="http://schemas.openxmlformats.org/presentationml/2006/main" showMasterSp="0" showMasterPhAnim="0">
+  <p:cSld>
+    <p:spTree>
+      <p:nvGrpSpPr>
+        <p:cNvPr id="1" name="Shape 179"/>
+        <p:cNvGrpSpPr/>
+        <p:nvPr/>
+      </p:nvGrpSpPr>
+      <p:grpSpPr>
+        <a:xfrm>
+          <a:off x="0" y="0"/>
+          <a:ext cx="0" cy="0"/>
+          <a:chOff x="0" y="0"/>
+          <a:chExt cx="0" cy="0"/>
+        </a:xfrm>
+      </p:grpSpPr>
+      <p:sp>
+        <p:nvSpPr>
+          <p:cNvPr id="180" name="Google Shape;180;gdd27230959_2_94:notes"/>
+          <p:cNvSpPr>
+            <a:spLocks noGrp="1" noRot="1" noChangeAspect="1"/>
+          </p:cNvSpPr>
+          <p:nvPr>
+            <p:ph type="sldImg" idx="2"/>
+          </p:nvPr>
+        </p:nvSpPr>
+        <p:spPr>
+          <a:xfrm>
+            <a:off x="1143000" y="685800"/>
+            <a:ext cx="4572000" cy="3429000"/>
+          </a:xfrm>
+          <a:custGeom>
+            <a:avLst/>
+            <a:gdLst/>
+            <a:ahLst/>
+            <a:cxnLst/>
+            <a:rect l="l" t="t" r="r" b="b"/>
+            <a:pathLst>
+              <a:path w="120000" h="120000" extrusionOk="0">
+                <a:moveTo>
+                  <a:pt x="0" y="0"/>
+                </a:moveTo>
+                <a:lnTo>
+                  <a:pt x="120000" y="0"/>
+                </a:lnTo>
+                <a:lnTo>
+                  <a:pt x="120000" y="120000"/>
+                </a:lnTo>
+                <a:lnTo>
+                  <a:pt x="0" y="120000"/>
+                </a:lnTo>
+                <a:close/>
+              </a:path>
+            </a:pathLst>
+          </a:custGeom>
+          <a:noFill/>
+          <a:ln w="12700" cap="flat" cmpd="sng">
+            <a:solidFill>
+              <a:srgbClr val="000000"/>
+            </a:solidFill>
+            <a:prstDash val="solid"/>
+            <a:round/>
+            <a:headEnd type="none" w="sm" len="sm"/>
+            <a:tailEnd type="none" w="sm" len="sm"/>
+          </a:ln>
+        </p:spPr>
+      </p:sp>
+      <p:sp>
+        <p:nvSpPr>
+          <p:cNvPr id="181" name="Google Shape;181;gdd27230959_2_94:notes"/>
+          <p:cNvSpPr txBox="1">
+            <a:spLocks noGrp="1"/>
+          </p:cNvSpPr>
+          <p:nvPr>
+            <p:ph type="body" idx="1"/>
+          </p:nvPr>
+        </p:nvSpPr>
+        <p:spPr>
+          <a:xfrm>
+            <a:off x="685800" y="4343400"/>
+            <a:ext cx="5486400" cy="4114800"/>
+          </a:xfrm>
+          <a:prstGeom prst="rect">
+            <a:avLst/>
+          </a:prstGeom>
+          <a:noFill/>
+          <a:ln>
+            <a:noFill/>
+          </a:ln>
+        </p:spPr>
+        <p:txBody>
+          <a:bodyPr spcFirstLastPara="1" wrap="square" lIns="91425" tIns="45700" rIns="91425" bIns="45700" anchor="t" anchorCtr="0">
+            <a:noAutofit/>
+          </a:bodyPr>
+          <a:lstStyle/>
+          <a:p>
+            <a:pPr marL="0" lvl="0" indent="0" algn="l" rtl="0">
+              <a:spcBef>
+                <a:spcPts val="0"/>
+              </a:spcBef>
+              <a:spcAft>
+                <a:spcPts val="0"/>
+              </a:spcAft>
+              <a:buNone/>
+            </a:pPr>
+            <a:endParaRPr dirty="0"/>
+          </a:p>
+        </p:txBody>
+      </p:sp>
+      <p:sp>
+        <p:nvSpPr>
+          <p:cNvPr id="182" name="Google Shape;182;gdd27230959_2_94:notes"/>
+          <p:cNvSpPr txBox="1">
+            <a:spLocks noGrp="1"/>
+          </p:cNvSpPr>
+          <p:nvPr>
+            <p:ph type="sldNum" idx="12"/>
+          </p:nvPr>
+        </p:nvSpPr>
+        <p:spPr>
+          <a:xfrm>
+            <a:off x="3884613" y="8685213"/>
+            <a:ext cx="2971800" cy="457200"/>
+          </a:xfrm>
+          <a:prstGeom prst="rect">
+            <a:avLst/>
+          </a:prstGeom>
+          <a:noFill/>
+          <a:ln>
+            <a:noFill/>
+          </a:ln>
+        </p:spPr>
+        <p:txBody>
+          <a:bodyPr spcFirstLastPara="1" wrap="square" lIns="91425" tIns="45700" rIns="91425" bIns="45700" anchor="b" anchorCtr="0">
+            <a:noAutofit/>
+          </a:bodyPr>
+          <a:lstStyle/>
+          <a:p>
+            <a:pPr marL="0" lvl="0" indent="0" algn="r" rtl="0">
+              <a:spcBef>
+                <a:spcPts val="0"/>
+              </a:spcBef>
+              <a:spcAft>
+                <a:spcPts val="0"/>
+              </a:spcAft>
+              <a:buNone/>
+            </a:pPr>
+            <a:fld id="{00000000-1234-1234-1234-123412341234}" type="slidenum">
+              <a:rPr lang="en-US"/>
+              <a:t>9</a:t>
+            </a:fld>
+            <a:endParaRPr/>
+          </a:p>
+        </p:txBody>
+      </p:sp>
+    </p:spTree>
+    <p:extLst>
+      <p:ext uri="{BB962C8B-B14F-4D97-AF65-F5344CB8AC3E}">
+        <p14:creationId xmlns:p14="http://schemas.microsoft.com/office/powerpoint/2010/main" val="2738642049"/>
       </p:ext>
     </p:extLst>
   </p:cSld>
@@ -14508,7 +15298,7 @@
               <a:buNone/>
             </a:pPr>
             <a:r>
-              <a:rPr lang="en-US" sz="2800" b="1" dirty="0">
+              <a:rPr lang="en-US" sz="2800" b="1">
                 <a:solidFill>
                   <a:schemeClr val="lt1"/>
                 </a:solidFill>
@@ -14517,7 +15307,7 @@
                 <a:cs typeface="Calibri"/>
                 <a:sym typeface="Calibri"/>
               </a:rPr>
-              <a:t>Introduction to Cryptographic Techniques</a:t>
+              <a:t>Cryptography</a:t>
             </a:r>
             <a:endParaRPr sz="2800" b="1" dirty="0">
               <a:solidFill>
@@ -15323,11 +16113,11 @@
   <p:clrMapOvr>
     <a:masterClrMapping/>
   </p:clrMapOvr>
-  <mc:AlternateContent xmlns:mc="http://schemas.openxmlformats.org/markup-compatibility/2006">
-    <mc:Choice xmlns:p14="http://schemas.microsoft.com/office/powerpoint/2010/main" Requires="p14">
+  <mc:AlternateContent xmlns:mc="http://schemas.openxmlformats.org/markup-compatibility/2006" xmlns:p14="http://schemas.microsoft.com/office/powerpoint/2010/main">
+    <mc:Choice Requires="p14">
       <p:transition p14:dur="0"/>
     </mc:Choice>
-    <mc:Fallback>
+    <mc:Fallback xmlns="">
       <p:transition/>
     </mc:Fallback>
   </mc:AlternateContent>
@@ -15506,11 +16296,11 @@
   <p:clrMapOvr>
     <a:masterClrMapping/>
   </p:clrMapOvr>
-  <mc:AlternateContent xmlns:mc="http://schemas.openxmlformats.org/markup-compatibility/2006">
-    <mc:Choice xmlns:p14="http://schemas.microsoft.com/office/powerpoint/2010/main" Requires="p14">
+  <mc:AlternateContent xmlns:mc="http://schemas.openxmlformats.org/markup-compatibility/2006" xmlns:p14="http://schemas.microsoft.com/office/powerpoint/2010/main">
+    <mc:Choice Requires="p14">
       <p:transition p14:dur="0"/>
     </mc:Choice>
-    <mc:Fallback>
+    <mc:Fallback xmlns="">
       <p:transition/>
     </mc:Fallback>
   </mc:AlternateContent>
@@ -15689,11 +16479,11 @@
   <p:clrMapOvr>
     <a:masterClrMapping/>
   </p:clrMapOvr>
-  <mc:AlternateContent xmlns:mc="http://schemas.openxmlformats.org/markup-compatibility/2006">
-    <mc:Choice xmlns:p14="http://schemas.microsoft.com/office/powerpoint/2010/main" Requires="p14">
+  <mc:AlternateContent xmlns:mc="http://schemas.openxmlformats.org/markup-compatibility/2006" xmlns:p14="http://schemas.microsoft.com/office/powerpoint/2010/main">
+    <mc:Choice Requires="p14">
       <p:transition p14:dur="0"/>
     </mc:Choice>
-    <mc:Fallback>
+    <mc:Fallback xmlns="">
       <p:transition/>
     </mc:Fallback>
   </mc:AlternateContent>
@@ -15866,6 +16656,100 @@
     <p:extLst>
       <p:ext uri="{BB962C8B-B14F-4D97-AF65-F5344CB8AC3E}">
         <p14:creationId xmlns:p14="http://schemas.microsoft.com/office/powerpoint/2010/main" val="2486173710"/>
+      </p:ext>
+    </p:extLst>
+  </p:cSld>
+  <p:clrMapOvr>
+    <a:masterClrMapping/>
+  </p:clrMapOvr>
+  <mc:AlternateContent xmlns:mc="http://schemas.openxmlformats.org/markup-compatibility/2006" xmlns:p14="http://schemas.microsoft.com/office/powerpoint/2010/main">
+    <mc:Choice Requires="p14">
+      <p:transition p14:dur="0"/>
+    </mc:Choice>
+    <mc:Fallback xmlns="">
+      <p:transition/>
+    </mc:Fallback>
+  </mc:AlternateContent>
+</p:sld>
+</file>
+
+<file path=ppt/slides/slide9.xml><?xml version="1.0" encoding="utf-8"?>
+<p:sld xmlns:a="http://schemas.openxmlformats.org/drawingml/2006/main" xmlns:r="http://schemas.openxmlformats.org/officeDocument/2006/relationships" xmlns:p="http://schemas.openxmlformats.org/presentationml/2006/main">
+  <p:cSld>
+    <p:spTree>
+      <p:nvGrpSpPr>
+        <p:cNvPr id="1" name="Shape 183"/>
+        <p:cNvGrpSpPr/>
+        <p:nvPr/>
+      </p:nvGrpSpPr>
+      <p:grpSpPr>
+        <a:xfrm>
+          <a:off x="0" y="0"/>
+          <a:ext cx="0" cy="0"/>
+          <a:chOff x="0" y="0"/>
+          <a:chExt cx="0" cy="0"/>
+        </a:xfrm>
+      </p:grpSpPr>
+      <p:pic>
+        <p:nvPicPr>
+          <p:cNvPr id="218" name="Google Shape;218;p29"/>
+          <p:cNvPicPr preferRelativeResize="0"/>
+          <p:nvPr/>
+        </p:nvPicPr>
+        <p:blipFill rotWithShape="1">
+          <a:blip r:embed="rId3">
+            <a:alphaModFix/>
+          </a:blip>
+          <a:srcRect/>
+          <a:stretch/>
+        </p:blipFill>
+        <p:spPr>
+          <a:xfrm>
+            <a:off x="3124200" y="6502400"/>
+            <a:ext cx="2895600" cy="355600"/>
+          </a:xfrm>
+          <a:prstGeom prst="rect">
+            <a:avLst/>
+          </a:prstGeom>
+          <a:noFill/>
+          <a:ln>
+            <a:noFill/>
+          </a:ln>
+        </p:spPr>
+      </p:pic>
+      <p:pic>
+        <p:nvPicPr>
+          <p:cNvPr id="6" name="Picture 5" descr="A black and white logo">
+            <a:extLst>
+              <a:ext uri="{FF2B5EF4-FFF2-40B4-BE49-F238E27FC236}">
+                <a16:creationId xmlns:a16="http://schemas.microsoft.com/office/drawing/2014/main" id="{8A18D31F-DA7C-961D-FF10-30899E0AFFC6}"/>
+              </a:ext>
+            </a:extLst>
+          </p:cNvPr>
+          <p:cNvPicPr>
+            <a:picLocks/>
+          </p:cNvPicPr>
+          <p:nvPr/>
+        </p:nvPicPr>
+        <p:blipFill rotWithShape="1">
+          <a:blip r:embed="rId4"/>
+          <a:srcRect l="22635"/>
+          <a:stretch/>
+        </p:blipFill>
+        <p:spPr>
+          <a:xfrm>
+            <a:off x="38711" y="6180684"/>
+            <a:ext cx="1821728" cy="561921"/>
+          </a:xfrm>
+          <a:prstGeom prst="rect">
+            <a:avLst/>
+          </a:prstGeom>
+        </p:spPr>
+      </p:pic>
+    </p:spTree>
+    <p:extLst>
+      <p:ext uri="{BB962C8B-B14F-4D97-AF65-F5344CB8AC3E}">
+        <p14:creationId xmlns:p14="http://schemas.microsoft.com/office/powerpoint/2010/main" val="1916915106"/>
       </p:ext>
     </p:extLst>
   </p:cSld>

</xml_diff>